<commit_message>
Updated the thread example.
</commit_message>
<xml_diff>
--- a/Presentations/Concurrent.pptx
+++ b/Presentations/Concurrent.pptx
@@ -18,6 +18,7 @@
     <p:sldId id="266" r:id="rId12"/>
     <p:sldId id="267" r:id="rId13"/>
     <p:sldId id="268" r:id="rId14"/>
+    <p:sldId id="269" r:id="rId15"/>
   </p:sldIdLst>
   <p:sldSz cx="12192000" cy="6858000"/>
   <p:notesSz cx="6858000" cy="9144000"/>
@@ -116,6 +117,11 @@
       </a:defRPr>
     </a:lvl9pPr>
   </p:defaultTextStyle>
+  <p:extLst>
+    <p:ext uri="{EFAFB233-063F-42B5-8137-9DF3F51BA10A}">
+      <p15:sldGuideLst xmlns:p15="http://schemas.microsoft.com/office/powerpoint/2012/main"/>
+    </p:ext>
+  </p:extLst>
 </p:presentation>
 </file>
 
@@ -266,7 +272,7 @@
           <a:p>
             <a:fld id="{8E3A7E25-818B-6144-A638-09E64CF66BCE}" type="datetimeFigureOut">
               <a:rPr lang="en-US" smtClean="0"/>
-              <a:t>12/3/23</a:t>
+              <a:t>12/4/23</a:t>
             </a:fld>
             <a:endParaRPr lang="en-US"/>
           </a:p>
@@ -464,7 +470,7 @@
           <a:p>
             <a:fld id="{8E3A7E25-818B-6144-A638-09E64CF66BCE}" type="datetimeFigureOut">
               <a:rPr lang="en-US" smtClean="0"/>
-              <a:t>12/3/23</a:t>
+              <a:t>12/4/23</a:t>
             </a:fld>
             <a:endParaRPr lang="en-US"/>
           </a:p>
@@ -672,7 +678,7 @@
           <a:p>
             <a:fld id="{8E3A7E25-818B-6144-A638-09E64CF66BCE}" type="datetimeFigureOut">
               <a:rPr lang="en-US" smtClean="0"/>
-              <a:t>12/3/23</a:t>
+              <a:t>12/4/23</a:t>
             </a:fld>
             <a:endParaRPr lang="en-US"/>
           </a:p>
@@ -870,7 +876,7 @@
           <a:p>
             <a:fld id="{8E3A7E25-818B-6144-A638-09E64CF66BCE}" type="datetimeFigureOut">
               <a:rPr lang="en-US" smtClean="0"/>
-              <a:t>12/3/23</a:t>
+              <a:t>12/4/23</a:t>
             </a:fld>
             <a:endParaRPr lang="en-US"/>
           </a:p>
@@ -1145,7 +1151,7 @@
           <a:p>
             <a:fld id="{8E3A7E25-818B-6144-A638-09E64CF66BCE}" type="datetimeFigureOut">
               <a:rPr lang="en-US" smtClean="0"/>
-              <a:t>12/3/23</a:t>
+              <a:t>12/4/23</a:t>
             </a:fld>
             <a:endParaRPr lang="en-US"/>
           </a:p>
@@ -1410,7 +1416,7 @@
           <a:p>
             <a:fld id="{8E3A7E25-818B-6144-A638-09E64CF66BCE}" type="datetimeFigureOut">
               <a:rPr lang="en-US" smtClean="0"/>
-              <a:t>12/3/23</a:t>
+              <a:t>12/4/23</a:t>
             </a:fld>
             <a:endParaRPr lang="en-US"/>
           </a:p>
@@ -1822,7 +1828,7 @@
           <a:p>
             <a:fld id="{8E3A7E25-818B-6144-A638-09E64CF66BCE}" type="datetimeFigureOut">
               <a:rPr lang="en-US" smtClean="0"/>
-              <a:t>12/3/23</a:t>
+              <a:t>12/4/23</a:t>
             </a:fld>
             <a:endParaRPr lang="en-US"/>
           </a:p>
@@ -1963,7 +1969,7 @@
           <a:p>
             <a:fld id="{8E3A7E25-818B-6144-A638-09E64CF66BCE}" type="datetimeFigureOut">
               <a:rPr lang="en-US" smtClean="0"/>
-              <a:t>12/3/23</a:t>
+              <a:t>12/4/23</a:t>
             </a:fld>
             <a:endParaRPr lang="en-US"/>
           </a:p>
@@ -2076,7 +2082,7 @@
           <a:p>
             <a:fld id="{8E3A7E25-818B-6144-A638-09E64CF66BCE}" type="datetimeFigureOut">
               <a:rPr lang="en-US" smtClean="0"/>
-              <a:t>12/3/23</a:t>
+              <a:t>12/4/23</a:t>
             </a:fld>
             <a:endParaRPr lang="en-US"/>
           </a:p>
@@ -2387,7 +2393,7 @@
           <a:p>
             <a:fld id="{8E3A7E25-818B-6144-A638-09E64CF66BCE}" type="datetimeFigureOut">
               <a:rPr lang="en-US" smtClean="0"/>
-              <a:t>12/3/23</a:t>
+              <a:t>12/4/23</a:t>
             </a:fld>
             <a:endParaRPr lang="en-US"/>
           </a:p>
@@ -2675,7 +2681,7 @@
           <a:p>
             <a:fld id="{8E3A7E25-818B-6144-A638-09E64CF66BCE}" type="datetimeFigureOut">
               <a:rPr lang="en-US" smtClean="0"/>
-              <a:t>12/3/23</a:t>
+              <a:t>12/4/23</a:t>
             </a:fld>
             <a:endParaRPr lang="en-US"/>
           </a:p>
@@ -2916,7 +2922,7 @@
           <a:p>
             <a:fld id="{8E3A7E25-818B-6144-A638-09E64CF66BCE}" type="datetimeFigureOut">
               <a:rPr lang="en-US" smtClean="0"/>
-              <a:t>12/3/23</a:t>
+              <a:t>12/4/23</a:t>
             </a:fld>
             <a:endParaRPr lang="en-US"/>
           </a:p>
@@ -5109,6 +5115,162 @@
 </p:sld>
 </file>
 
+<file path=ppt/slides/slide14.xml><?xml version="1.0" encoding="utf-8"?>
+<p:sld xmlns:a="http://schemas.openxmlformats.org/drawingml/2006/main" xmlns:r="http://schemas.openxmlformats.org/officeDocument/2006/relationships" xmlns:p="http://schemas.openxmlformats.org/presentationml/2006/main">
+  <p:cSld>
+    <p:spTree>
+      <p:nvGrpSpPr>
+        <p:cNvPr id="1" name=""/>
+        <p:cNvGrpSpPr/>
+        <p:nvPr/>
+      </p:nvGrpSpPr>
+      <p:grpSpPr>
+        <a:xfrm>
+          <a:off x="0" y="0"/>
+          <a:ext cx="0" cy="0"/>
+          <a:chOff x="0" y="0"/>
+          <a:chExt cx="0" cy="0"/>
+        </a:xfrm>
+      </p:grpSpPr>
+      <p:sp>
+        <p:nvSpPr>
+          <p:cNvPr id="2" name="Title 1">
+            <a:extLst>
+              <a:ext uri="{FF2B5EF4-FFF2-40B4-BE49-F238E27FC236}">
+                <a16:creationId xmlns:a16="http://schemas.microsoft.com/office/drawing/2014/main" id="{9F8BCFAF-F040-31D5-3E08-3A16BE8164A3}"/>
+              </a:ext>
+            </a:extLst>
+          </p:cNvPr>
+          <p:cNvSpPr>
+            <a:spLocks noGrp="1"/>
+          </p:cNvSpPr>
+          <p:nvPr>
+            <p:ph type="title"/>
+          </p:nvPr>
+        </p:nvSpPr>
+        <p:spPr/>
+        <p:txBody>
+          <a:bodyPr/>
+          <a:lstStyle/>
+          <a:p>
+            <a:r>
+              <a:rPr lang="en-US" i="1" dirty="0"/>
+              <a:t>Finish Me!</a:t>
+            </a:r>
+          </a:p>
+        </p:txBody>
+      </p:sp>
+      <p:sp>
+        <p:nvSpPr>
+          <p:cNvPr id="3" name="Content Placeholder 2">
+            <a:extLst>
+              <a:ext uri="{FF2B5EF4-FFF2-40B4-BE49-F238E27FC236}">
+                <a16:creationId xmlns:a16="http://schemas.microsoft.com/office/drawing/2014/main" id="{900D5CF0-7E56-CB32-7081-A5B75942BF8B}"/>
+              </a:ext>
+            </a:extLst>
+          </p:cNvPr>
+          <p:cNvSpPr>
+            <a:spLocks noGrp="1"/>
+          </p:cNvSpPr>
+          <p:nvPr>
+            <p:ph idx="1"/>
+          </p:nvPr>
+        </p:nvSpPr>
+        <p:spPr/>
+        <p:txBody>
+          <a:bodyPr/>
+          <a:lstStyle/>
+          <a:p>
+            <a:r>
+              <a:rPr lang="en-US" dirty="0"/>
+              <a:t>Topics to include:</a:t>
+            </a:r>
+          </a:p>
+          <a:p>
+            <a:pPr lvl="1"/>
+            <a:r>
+              <a:rPr lang="en-US" dirty="0"/>
+              <a:t>Returning values from threads</a:t>
+            </a:r>
+          </a:p>
+          <a:p>
+            <a:pPr lvl="1"/>
+            <a:r>
+              <a:rPr lang="en-US" dirty="0"/>
+              <a:t>The </a:t>
+            </a:r>
+            <a:r>
+              <a:rPr lang="en-US" dirty="0">
+                <a:latin typeface="Consolas" panose="020B0609020204030204" pitchFamily="49" charset="0"/>
+                <a:cs typeface="Consolas" panose="020B0609020204030204" pitchFamily="49" charset="0"/>
+              </a:rPr>
+              <a:t>std::</a:t>
+            </a:r>
+            <a:r>
+              <a:rPr lang="en-US" dirty="0" err="1">
+                <a:latin typeface="Consolas" panose="020B0609020204030204" pitchFamily="49" charset="0"/>
+                <a:cs typeface="Consolas" panose="020B0609020204030204" pitchFamily="49" charset="0"/>
+              </a:rPr>
+              <a:t>this_thread</a:t>
+            </a:r>
+            <a:r>
+              <a:rPr lang="en-US" dirty="0"/>
+              <a:t> name space</a:t>
+            </a:r>
+          </a:p>
+          <a:p>
+            <a:pPr lvl="1"/>
+            <a:r>
+              <a:rPr lang="en-US" dirty="0">
+                <a:latin typeface="Consolas" panose="020B0609020204030204" pitchFamily="49" charset="0"/>
+                <a:cs typeface="Consolas" panose="020B0609020204030204" pitchFamily="49" charset="0"/>
+              </a:rPr>
+              <a:t>std::mutex</a:t>
+            </a:r>
+          </a:p>
+          <a:p>
+            <a:pPr lvl="1"/>
+            <a:r>
+              <a:rPr lang="en-US" dirty="0"/>
+              <a:t>Lock guards</a:t>
+            </a:r>
+          </a:p>
+          <a:p>
+            <a:pPr lvl="1"/>
+            <a:r>
+              <a:rPr lang="en-US" dirty="0"/>
+              <a:t>R/W locks</a:t>
+            </a:r>
+          </a:p>
+          <a:p>
+            <a:pPr lvl="1"/>
+            <a:r>
+              <a:rPr lang="en-US" dirty="0"/>
+              <a:t>Condition variables</a:t>
+            </a:r>
+          </a:p>
+          <a:p>
+            <a:pPr lvl="1"/>
+            <a:r>
+              <a:rPr lang="en-US" dirty="0"/>
+              <a:t>Futures and promises</a:t>
+            </a:r>
+          </a:p>
+        </p:txBody>
+      </p:sp>
+    </p:spTree>
+    <p:extLst>
+      <p:ext uri="{BB962C8B-B14F-4D97-AF65-F5344CB8AC3E}">
+        <p14:creationId xmlns:p14="http://schemas.microsoft.com/office/powerpoint/2010/main" val="1012599075"/>
+      </p:ext>
+    </p:extLst>
+  </p:cSld>
+  <p:clrMapOvr>
+    <a:masterClrMapping/>
+  </p:clrMapOvr>
+</p:sld>
+</file>
+
 <file path=ppt/slides/slide2.xml><?xml version="1.0" encoding="utf-8"?>
 <p:sld xmlns:a="http://schemas.openxmlformats.org/drawingml/2006/main" xmlns:r="http://schemas.openxmlformats.org/officeDocument/2006/relationships" xmlns:p="http://schemas.openxmlformats.org/presentationml/2006/main">
   <p:cSld>

</xml_diff>